<commit_message>
up to date decks
</commit_message>
<xml_diff>
--- a/InfoPath/Guidance/Decks/Office 365 JDP InfoPath - Post migration guidance.pptx
+++ b/InfoPath/Guidance/Decks/Office 365 JDP InfoPath - Post migration guidance.pptx
@@ -6,10 +6,10 @@
     <p:sldMasterId id="2147484149" r:id="rId8"/>
   </p:sldMasterIdLst>
   <p:notesMasterIdLst>
-    <p:notesMasterId r:id="rId23"/>
+    <p:notesMasterId r:id="rId31"/>
   </p:notesMasterIdLst>
   <p:handoutMasterIdLst>
-    <p:handoutMasterId r:id="rId24"/>
+    <p:handoutMasterId r:id="rId32"/>
   </p:handoutMasterIdLst>
   <p:sldIdLst>
     <p:sldId id="1487" r:id="rId9"/>
@@ -22,10 +22,18 @@
     <p:sldId id="1505" r:id="rId16"/>
     <p:sldId id="1507" r:id="rId17"/>
     <p:sldId id="1509" r:id="rId18"/>
-    <p:sldId id="1502" r:id="rId19"/>
-    <p:sldId id="1508" r:id="rId20"/>
-    <p:sldId id="1417" r:id="rId21"/>
-    <p:sldId id="1418" r:id="rId22"/>
+    <p:sldId id="1510" r:id="rId19"/>
+    <p:sldId id="1513" r:id="rId20"/>
+    <p:sldId id="1514" r:id="rId21"/>
+    <p:sldId id="1502" r:id="rId22"/>
+    <p:sldId id="1516" r:id="rId23"/>
+    <p:sldId id="1511" r:id="rId24"/>
+    <p:sldId id="1512" r:id="rId25"/>
+    <p:sldId id="1508" r:id="rId26"/>
+    <p:sldId id="1515" r:id="rId27"/>
+    <p:sldId id="1517" r:id="rId28"/>
+    <p:sldId id="1417" r:id="rId29"/>
+    <p:sldId id="1418" r:id="rId30"/>
   </p:sldIdLst>
   <p:sldSz cx="12188825" cy="6858000"/>
   <p:notesSz cx="7086600" cy="9372600"/>
@@ -348,7 +356,7 @@
           <a:p>
             <a:fld id="{DE219B1A-AE41-483B-A766-69B9363DDA6A}" type="datetimeFigureOut">
               <a:rPr lang="en-US" smtClean="0"/>
-              <a:t>2/10/2016</a:t>
+              <a:t>4/8/2016</a:t>
             </a:fld>
             <a:endParaRPr lang="en-US"/>
           </a:p>
@@ -557,7 +565,7 @@
           <a:p>
             <a:fld id="{D51B1278-D92B-4AF3-A9C1-71DD298190CE}" type="datetimeFigureOut">
               <a:rPr lang="en-US" smtClean="0"/>
-              <a:t>2/10/2016</a:t>
+              <a:t>4/8/2016</a:t>
             </a:fld>
             <a:endParaRPr lang="en-US"/>
           </a:p>
@@ -1000,7 +1008,7 @@
                 </a:solidFill>
               </a:rPr>
               <a:pPr/>
-              <a:t>2/10/2016</a:t>
+              <a:t>4/8/2016</a:t>
             </a:fld>
             <a:endParaRPr lang="en-US" dirty="0">
               <a:solidFill>
@@ -11808,7 +11816,7 @@
           <a:p>
             <a:r>
               <a:rPr lang="en-US" dirty="0"/>
-              <a:t>Known issues</a:t>
+              <a:t>Fixing user data in migrated InfoPath files</a:t>
             </a:r>
           </a:p>
         </p:txBody>
@@ -11816,7 +11824,7 @@
     </p:spTree>
     <p:extLst>
       <p:ext uri="{BB962C8B-B14F-4D97-AF65-F5344CB8AC3E}">
-        <p14:creationId xmlns:p14="http://schemas.microsoft.com/office/powerpoint/2010/main" val="3487735251"/>
+        <p14:creationId xmlns:p14="http://schemas.microsoft.com/office/powerpoint/2010/main" val="2901776701"/>
       </p:ext>
     </p:extLst>
   </p:cSld>
@@ -11863,7 +11871,7 @@
           <a:p>
             <a:r>
               <a:rPr lang="en-US" dirty="0"/>
-              <a:t>Hard coded account references</a:t>
+              <a:t>Problem statement</a:t>
             </a:r>
             <a:endParaRPr lang="nl-BE" dirty="0"/>
           </a:p>
@@ -11879,26 +11887,35 @@
             <p:ph type="body" sz="quarter" idx="10"/>
           </p:nvPr>
         </p:nvSpPr>
-        <p:spPr>
-          <a:xfrm>
-            <a:off x="519112" y="1447798"/>
-            <a:ext cx="11149013" cy="4495801"/>
-          </a:xfrm>
-        </p:spPr>
+        <p:spPr/>
         <p:txBody>
           <a:bodyPr/>
           <a:lstStyle/>
           <a:p>
             <a:r>
               <a:rPr lang="en-US" dirty="0"/>
-              <a:t>Problem:</a:t>
+              <a:t>After migration you open a previously created InfoPath file and the entered user/group information is shown as invalid</a:t>
+            </a:r>
+          </a:p>
+          <a:p>
+            <a:r>
+              <a:rPr lang="en-US" dirty="0"/>
+              <a:t>Reason:</a:t>
             </a:r>
           </a:p>
           <a:p>
             <a:pPr lvl="1"/>
             <a:r>
               <a:rPr lang="en-US" dirty="0"/>
-              <a:t>Forms can contain hard coded account references in the form of </a:t>
+              <a:t>Due to a change in the identity approach user information is defined differently in </a:t>
+            </a:r>
+            <a:r>
+              <a:rPr lang="en-US" dirty="0" err="1"/>
+              <a:t>DvNext</a:t>
+            </a:r>
+            <a:r>
+              <a:rPr lang="en-US" dirty="0"/>
+              <a:t>/MT: </a:t>
             </a:r>
             <a:r>
               <a:rPr lang="en-US" b="1" dirty="0"/>
@@ -11906,58 +11923,11 @@
             </a:r>
             <a:r>
               <a:rPr lang="en-US" dirty="0"/>
-              <a:t>or </a:t>
-            </a:r>
-            <a:r>
-              <a:rPr lang="en-US" b="1" dirty="0"/>
-              <a:t>domain\user</a:t>
-            </a:r>
-          </a:p>
-          <a:p>
-            <a:pPr lvl="1"/>
-            <a:r>
-              <a:rPr lang="en-US" dirty="0"/>
-              <a:t>In </a:t>
-            </a:r>
-            <a:r>
-              <a:rPr lang="en-US" dirty="0" err="1"/>
-              <a:t>DvNext</a:t>
-            </a:r>
-            <a:r>
-              <a:rPr lang="en-US" dirty="0"/>
-              <a:t> / MT this needs to be converted to the following </a:t>
+              <a:t>is used in SharePoint 2013/2016 whereas SharePoint Online uses </a:t>
             </a:r>
             <a:r>
               <a:rPr lang="en-US" b="1" dirty="0"/>
               <a:t>i:0#.f|membership|user@domain </a:t>
-            </a:r>
-          </a:p>
-          <a:p>
-            <a:r>
-              <a:rPr lang="en-US" dirty="0"/>
-              <a:t>Advice:</a:t>
-            </a:r>
-          </a:p>
-          <a:p>
-            <a:pPr lvl="1"/>
-            <a:r>
-              <a:rPr lang="en-US" dirty="0"/>
-              <a:t>If the hard coded reference actually should be the current user then replace with the </a:t>
-            </a:r>
-            <a:r>
-              <a:rPr lang="en-US" dirty="0" err="1"/>
-              <a:t>userName</a:t>
-            </a:r>
-            <a:r>
-              <a:rPr lang="en-US" dirty="0"/>
-              <a:t>() function and republish the form</a:t>
-            </a:r>
-          </a:p>
-          <a:p>
-            <a:pPr lvl="1"/>
-            <a:r>
-              <a:rPr lang="en-US" dirty="0"/>
-              <a:t>In all other cases change the hard coded value into the new model and republish the form</a:t>
             </a:r>
             <a:endParaRPr lang="nl-BE" dirty="0"/>
           </a:p>
@@ -11966,7 +11936,7 @@
     </p:spTree>
     <p:extLst>
       <p:ext uri="{BB962C8B-B14F-4D97-AF65-F5344CB8AC3E}">
-        <p14:creationId xmlns:p14="http://schemas.microsoft.com/office/powerpoint/2010/main" val="3247217968"/>
+        <p14:creationId xmlns:p14="http://schemas.microsoft.com/office/powerpoint/2010/main" val="1232509208"/>
       </p:ext>
     </p:extLst>
   </p:cSld>
@@ -11996,10 +11966,80 @@
           <a:chExt cx="0" cy="0"/>
         </a:xfrm>
       </p:grpSpPr>
+      <p:sp>
+        <p:nvSpPr>
+          <p:cNvPr id="2" name="Title 1"/>
+          <p:cNvSpPr>
+            <a:spLocks noGrp="1"/>
+          </p:cNvSpPr>
+          <p:nvPr>
+            <p:ph type="title"/>
+          </p:nvPr>
+        </p:nvSpPr>
+        <p:spPr/>
+        <p:txBody>
+          <a:bodyPr/>
+          <a:lstStyle/>
+          <a:p>
+            <a:r>
+              <a:rPr lang="en-US" dirty="0"/>
+              <a:t>How to fix this</a:t>
+            </a:r>
+            <a:endParaRPr lang="nl-BE" dirty="0"/>
+          </a:p>
+        </p:txBody>
+      </p:sp>
+      <p:sp>
+        <p:nvSpPr>
+          <p:cNvPr id="3" name="Text Placeholder 2"/>
+          <p:cNvSpPr>
+            <a:spLocks noGrp="1"/>
+          </p:cNvSpPr>
+          <p:nvPr>
+            <p:ph type="body" sz="quarter" idx="10"/>
+          </p:nvPr>
+        </p:nvSpPr>
+        <p:spPr/>
+        <p:txBody>
+          <a:bodyPr/>
+          <a:lstStyle/>
+          <a:p>
+            <a:r>
+              <a:rPr lang="en-US" b="1" dirty="0"/>
+              <a:t>Option 1</a:t>
+            </a:r>
+            <a:r>
+              <a:rPr lang="en-US" dirty="0"/>
+              <a:t>: when users open an existing InfoPath file they simply update the stored user values</a:t>
+            </a:r>
+          </a:p>
+          <a:p>
+            <a:r>
+              <a:rPr lang="en-US" b="1" dirty="0"/>
+              <a:t>Option 2</a:t>
+            </a:r>
+            <a:r>
+              <a:rPr lang="en-US" dirty="0"/>
+              <a:t>: Use CSOM utility to perform bulk replacement. See </a:t>
+            </a:r>
+            <a:r>
+              <a:rPr lang="en-US" dirty="0">
+                <a:hlinkClick r:id="rId2"/>
+              </a:rPr>
+              <a:t>https://github.com/OfficeDev/PnP-Transformation/tree/dev/InfoPath/Migration/PeoplePickerRemediation.Console</a:t>
+            </a:r>
+            <a:r>
+              <a:rPr lang="en-US" dirty="0"/>
+              <a:t> </a:t>
+            </a:r>
+            <a:endParaRPr lang="nl-BE" dirty="0"/>
+          </a:p>
+        </p:txBody>
+      </p:sp>
     </p:spTree>
     <p:extLst>
       <p:ext uri="{BB962C8B-B14F-4D97-AF65-F5344CB8AC3E}">
-        <p14:creationId xmlns:p14="http://schemas.microsoft.com/office/powerpoint/2010/main" val="2958316264"/>
+        <p14:creationId xmlns:p14="http://schemas.microsoft.com/office/powerpoint/2010/main" val="211152156"/>
       </p:ext>
     </p:extLst>
   </p:cSld>
@@ -12031,131 +12071,751 @@
       </p:grpSpPr>
       <p:sp>
         <p:nvSpPr>
-          <p:cNvPr id="3" name="Text Box 3"/>
-          <p:cNvSpPr txBox="1">
-            <a:spLocks noChangeArrowheads="1"/>
+          <p:cNvPr id="4" name="Title 3"/>
+          <p:cNvSpPr>
+            <a:spLocks noGrp="1"/>
           </p:cNvSpPr>
-          <p:nvPr/>
+          <p:nvPr>
+            <p:ph type="title"/>
+          </p:nvPr>
         </p:nvSpPr>
-        <p:spPr bwMode="blackWhite">
-          <a:xfrm>
-            <a:off x="267614" y="5959359"/>
-            <a:ext cx="10755853" cy="606312"/>
-          </a:xfrm>
-          <a:prstGeom prst="rect">
-            <a:avLst/>
-          </a:prstGeom>
-          <a:noFill/>
-          <a:ln w="12700">
-            <a:noFill/>
-            <a:miter lim="800000"/>
-            <a:headEnd type="none" w="sm" len="sm"/>
-            <a:tailEnd type="none" w="sm" len="sm"/>
-          </a:ln>
-          <a:effectLst/>
-        </p:spPr>
+        <p:spPr/>
         <p:txBody>
-          <a:bodyPr vert="horz" wrap="square" lIns="179238" tIns="143391" rIns="179238" bIns="143391" numCol="1" anchor="t" anchorCtr="0" compatLnSpc="1">
-            <a:prstTxWarp prst="textNoShape">
-              <a:avLst/>
-            </a:prstTxWarp>
-            <a:spAutoFit/>
-          </a:bodyPr>
+          <a:bodyPr/>
           <a:lstStyle/>
           <a:p>
-            <a:pPr defTabSz="913737" eaLnBrk="0" hangingPunct="0"/>
-            <a:r>
-              <a:rPr lang="en-US" sz="686" dirty="0">
-                <a:gradFill>
-                  <a:gsLst>
-                    <a:gs pos="0">
-                      <a:srgbClr val="FFFFFF"/>
-                    </a:gs>
-                    <a:gs pos="100000">
-                      <a:srgbClr val="FFFFFF"/>
-                    </a:gs>
-                  </a:gsLst>
-                  <a:lin ang="5400000" scaled="0"/>
-                </a:gradFill>
-                <a:cs typeface="Segoe UI" pitchFamily="34" charset="0"/>
-              </a:rPr>
-              <a:t>© 2014 Microsoft Corporation. All rights reserved. Microsoft, Windows, Windows Vista and other product names are or may be registered trademarks and/or trademarks in the U.S. and/or other countries.</a:t>
-            </a:r>
-          </a:p>
-          <a:p>
-            <a:pPr defTabSz="913737" eaLnBrk="0" hangingPunct="0"/>
-            <a:r>
-              <a:rPr lang="en-US" sz="686" dirty="0">
-                <a:gradFill>
-                  <a:gsLst>
-                    <a:gs pos="0">
-                      <a:srgbClr val="FFFFFF"/>
-                    </a:gs>
-                    <a:gs pos="100000">
-                      <a:srgbClr val="FFFFFF"/>
-                    </a:gs>
-                  </a:gsLst>
-                  <a:lin ang="5400000" scaled="0"/>
-                </a:gradFill>
-                <a:cs typeface="Segoe UI" pitchFamily="34" charset="0"/>
-              </a:rPr>
-              <a:t>The information herein is for informational purposes only and represents the current view of Microsoft Corporation as of the date of this presentation.  Because Microsoft must respond to changing market conditions, it should not be interpreted to be a commitment on the part of Microsoft, and Microsoft cannot guarantee the accuracy of any information provided after the date of this presentation.  MICROSOFT MAKES NO WARRANTIES, EXPRESS, IMPLIED OR STATUTORY, AS TO THE INFORMATION IN THIS PRESENTATION.</a:t>
+            <a:r>
+              <a:rPr lang="en-US" dirty="0"/>
+              <a:t>Known issues</a:t>
             </a:r>
           </a:p>
         </p:txBody>
       </p:sp>
-      <p:pic>
-        <p:nvPicPr>
-          <p:cNvPr id="2" name="Picture 1"/>
-          <p:cNvPicPr>
-            <a:picLocks noChangeAspect="1"/>
-          </p:cNvPicPr>
-          <p:nvPr/>
-        </p:nvPicPr>
-        <p:blipFill>
-          <a:blip r:embed="rId3">
-            <a:extLst>
-              <a:ext uri="{28A0092B-C50C-407E-A947-70E740481C1C}">
-                <a14:useLocalDpi xmlns:a14="http://schemas.microsoft.com/office/drawing/2010/main" val="0"/>
-              </a:ext>
-            </a:extLst>
-          </a:blip>
-          <a:stretch>
-            <a:fillRect/>
-          </a:stretch>
-        </p:blipFill>
-        <p:spPr bwMode="invGray">
-          <a:xfrm>
-            <a:off x="450085" y="3083792"/>
-            <a:ext cx="3223021" cy="690417"/>
-          </a:xfrm>
-          <a:prstGeom prst="rect">
-            <a:avLst/>
-          </a:prstGeom>
-        </p:spPr>
-      </p:pic>
     </p:spTree>
     <p:extLst>
       <p:ext uri="{BB962C8B-B14F-4D97-AF65-F5344CB8AC3E}">
-        <p14:creationId xmlns:p14="http://schemas.microsoft.com/office/powerpoint/2010/main" val="4060165635"/>
+        <p14:creationId xmlns:p14="http://schemas.microsoft.com/office/powerpoint/2010/main" val="3487735251"/>
       </p:ext>
     </p:extLst>
   </p:cSld>
   <p:clrMapOvr>
     <a:masterClrMapping/>
   </p:clrMapOvr>
-  <mc:AlternateContent xmlns:mc="http://schemas.openxmlformats.org/markup-compatibility/2006" xmlns:p14="http://schemas.microsoft.com/office/powerpoint/2010/main">
-    <mc:Choice Requires="p14">
-      <p:transition spd="med" p14:dur="700">
-        <p:fade/>
-      </p:transition>
-    </mc:Choice>
-    <mc:Fallback xmlns="">
-      <p:transition spd="med">
-        <p:fade/>
-      </p:transition>
-    </mc:Fallback>
-  </mc:AlternateContent>
+  <p:transition>
+    <p:fade/>
+  </p:transition>
+</p:sld>
+</file>
+
+<file path=ppt/slides/slide15.xml><?xml version="1.0" encoding="utf-8"?>
+<p:sld xmlns:a="http://schemas.openxmlformats.org/drawingml/2006/main" xmlns:r="http://schemas.openxmlformats.org/officeDocument/2006/relationships" xmlns:p="http://schemas.openxmlformats.org/presentationml/2006/main">
+  <p:cSld>
+    <p:spTree>
+      <p:nvGrpSpPr>
+        <p:cNvPr id="1" name=""/>
+        <p:cNvGrpSpPr/>
+        <p:nvPr/>
+      </p:nvGrpSpPr>
+      <p:grpSpPr>
+        <a:xfrm>
+          <a:off x="0" y="0"/>
+          <a:ext cx="0" cy="0"/>
+          <a:chOff x="0" y="0"/>
+          <a:chExt cx="0" cy="0"/>
+        </a:xfrm>
+      </p:grpSpPr>
+      <p:sp>
+        <p:nvSpPr>
+          <p:cNvPr id="2" name="Title 1"/>
+          <p:cNvSpPr>
+            <a:spLocks noGrp="1"/>
+          </p:cNvSpPr>
+          <p:nvPr>
+            <p:ph type="title"/>
+          </p:nvPr>
+        </p:nvSpPr>
+        <p:spPr/>
+        <p:txBody>
+          <a:bodyPr/>
+          <a:lstStyle/>
+          <a:p>
+            <a:r>
+              <a:rPr lang="en-US" dirty="0"/>
+              <a:t>Known Issues</a:t>
+            </a:r>
+            <a:endParaRPr lang="nl-BE" dirty="0"/>
+          </a:p>
+        </p:txBody>
+      </p:sp>
+      <p:sp>
+        <p:nvSpPr>
+          <p:cNvPr id="3" name="Text Placeholder 2"/>
+          <p:cNvSpPr>
+            <a:spLocks noGrp="1"/>
+          </p:cNvSpPr>
+          <p:nvPr>
+            <p:ph type="body" sz="quarter" idx="10"/>
+          </p:nvPr>
+        </p:nvSpPr>
+        <p:spPr/>
+        <p:txBody>
+          <a:bodyPr/>
+          <a:lstStyle/>
+          <a:p>
+            <a:r>
+              <a:rPr lang="en-US" dirty="0"/>
+              <a:t>Forms that read too much data or are too complex</a:t>
+            </a:r>
+          </a:p>
+          <a:p>
+            <a:r>
+              <a:rPr lang="en-US" dirty="0"/>
+              <a:t>Hard coded account references in forms</a:t>
+            </a:r>
+          </a:p>
+          <a:p>
+            <a:r>
+              <a:rPr lang="en-US" dirty="0"/>
+              <a:t>Forms calling into SPO rest service when being filled via the InfoPath client</a:t>
+            </a:r>
+          </a:p>
+          <a:p>
+            <a:r>
+              <a:rPr lang="en-US" dirty="0"/>
+              <a:t>Form is showing wrong date time</a:t>
+            </a:r>
+            <a:endParaRPr lang="nl-BE" dirty="0"/>
+          </a:p>
+        </p:txBody>
+      </p:sp>
+    </p:spTree>
+    <p:extLst>
+      <p:ext uri="{BB962C8B-B14F-4D97-AF65-F5344CB8AC3E}">
+        <p14:creationId xmlns:p14="http://schemas.microsoft.com/office/powerpoint/2010/main" val="807674449"/>
+      </p:ext>
+    </p:extLst>
+  </p:cSld>
+  <p:clrMapOvr>
+    <a:masterClrMapping/>
+  </p:clrMapOvr>
+  <p:transition>
+    <p:fade/>
+  </p:transition>
+</p:sld>
+</file>
+
+<file path=ppt/slides/slide16.xml><?xml version="1.0" encoding="utf-8"?>
+<p:sld xmlns:a="http://schemas.openxmlformats.org/drawingml/2006/main" xmlns:r="http://schemas.openxmlformats.org/officeDocument/2006/relationships" xmlns:p="http://schemas.openxmlformats.org/presentationml/2006/main">
+  <p:cSld>
+    <p:spTree>
+      <p:nvGrpSpPr>
+        <p:cNvPr id="1" name=""/>
+        <p:cNvGrpSpPr/>
+        <p:nvPr/>
+      </p:nvGrpSpPr>
+      <p:grpSpPr>
+        <a:xfrm>
+          <a:off x="0" y="0"/>
+          <a:ext cx="0" cy="0"/>
+          <a:chOff x="0" y="0"/>
+          <a:chExt cx="0" cy="0"/>
+        </a:xfrm>
+      </p:grpSpPr>
+      <p:sp>
+        <p:nvSpPr>
+          <p:cNvPr id="2" name="Title 1"/>
+          <p:cNvSpPr>
+            <a:spLocks noGrp="1"/>
+          </p:cNvSpPr>
+          <p:nvPr>
+            <p:ph type="title"/>
+          </p:nvPr>
+        </p:nvSpPr>
+        <p:spPr/>
+        <p:txBody>
+          <a:bodyPr/>
+          <a:lstStyle/>
+          <a:p>
+            <a:r>
+              <a:rPr lang="en-US" sz="4000" dirty="0"/>
+              <a:t>Forms that read too much data or are too complex</a:t>
+            </a:r>
+            <a:endParaRPr lang="nl-BE" sz="4000" dirty="0"/>
+          </a:p>
+        </p:txBody>
+      </p:sp>
+      <p:sp>
+        <p:nvSpPr>
+          <p:cNvPr id="3" name="Text Placeholder 2"/>
+          <p:cNvSpPr>
+            <a:spLocks noGrp="1"/>
+          </p:cNvSpPr>
+          <p:nvPr>
+            <p:ph type="body" sz="quarter" idx="10"/>
+          </p:nvPr>
+        </p:nvSpPr>
+        <p:spPr/>
+        <p:txBody>
+          <a:bodyPr/>
+          <a:lstStyle/>
+          <a:p>
+            <a:r>
+              <a:rPr lang="en-US" dirty="0"/>
+              <a:t>Problem:</a:t>
+            </a:r>
+          </a:p>
+          <a:p>
+            <a:pPr lvl="1"/>
+            <a:r>
+              <a:rPr lang="en-US" dirty="0"/>
+              <a:t>You see the following error “The form could not be displayed because default values or rules are taking too long to evaluate. To correct this, simplify the expressions or reduce the size of the data sets that they depend on.”</a:t>
+            </a:r>
+          </a:p>
+          <a:p>
+            <a:r>
+              <a:rPr lang="en-US" dirty="0"/>
+              <a:t>Advice:</a:t>
+            </a:r>
+          </a:p>
+          <a:p>
+            <a:pPr lvl="1"/>
+            <a:r>
+              <a:rPr lang="en-US" dirty="0"/>
+              <a:t>SharePoint Online (MT or </a:t>
+            </a:r>
+            <a:r>
+              <a:rPr lang="en-US" dirty="0" err="1"/>
+              <a:t>DvNext</a:t>
+            </a:r>
+            <a:r>
+              <a:rPr lang="en-US" dirty="0"/>
+              <a:t>) has different, non changeable, InfoPath configuration which can result in this error for either forms that read a large amount of data or are very complex</a:t>
+            </a:r>
+          </a:p>
+          <a:p>
+            <a:pPr lvl="1"/>
+            <a:r>
+              <a:rPr lang="en-US" dirty="0"/>
+              <a:t>Form rule fails on account processing (e.g. search for / in i:0#.w|domain\user whereas in MT/</a:t>
+            </a:r>
+            <a:r>
+              <a:rPr lang="en-US" dirty="0" err="1"/>
+              <a:t>DvNext</a:t>
+            </a:r>
+            <a:r>
+              <a:rPr lang="en-US" dirty="0"/>
+              <a:t> the user is shown as i:0#.f|membership|user@domain) which triggers a cascade of rule failures…which can result in this error</a:t>
+            </a:r>
+          </a:p>
+          <a:p>
+            <a:pPr lvl="1"/>
+            <a:r>
+              <a:rPr lang="en-US" dirty="0"/>
+              <a:t>Solution is to redesign the form to overcome this problem</a:t>
+            </a:r>
+            <a:endParaRPr lang="nl-BE" dirty="0"/>
+          </a:p>
+        </p:txBody>
+      </p:sp>
+    </p:spTree>
+    <p:extLst>
+      <p:ext uri="{BB962C8B-B14F-4D97-AF65-F5344CB8AC3E}">
+        <p14:creationId xmlns:p14="http://schemas.microsoft.com/office/powerpoint/2010/main" val="2100067136"/>
+      </p:ext>
+    </p:extLst>
+  </p:cSld>
+  <p:clrMapOvr>
+    <a:masterClrMapping/>
+  </p:clrMapOvr>
+  <p:transition>
+    <p:fade/>
+  </p:transition>
+</p:sld>
+</file>
+
+<file path=ppt/slides/slide17.xml><?xml version="1.0" encoding="utf-8"?>
+<p:sld xmlns:a="http://schemas.openxmlformats.org/drawingml/2006/main" xmlns:r="http://schemas.openxmlformats.org/officeDocument/2006/relationships" xmlns:p="http://schemas.openxmlformats.org/presentationml/2006/main">
+  <p:cSld>
+    <p:spTree>
+      <p:nvGrpSpPr>
+        <p:cNvPr id="1" name=""/>
+        <p:cNvGrpSpPr/>
+        <p:nvPr/>
+      </p:nvGrpSpPr>
+      <p:grpSpPr>
+        <a:xfrm>
+          <a:off x="0" y="0"/>
+          <a:ext cx="0" cy="0"/>
+          <a:chOff x="0" y="0"/>
+          <a:chExt cx="0" cy="0"/>
+        </a:xfrm>
+      </p:grpSpPr>
+      <p:sp>
+        <p:nvSpPr>
+          <p:cNvPr id="2" name="Title 1"/>
+          <p:cNvSpPr>
+            <a:spLocks noGrp="1"/>
+          </p:cNvSpPr>
+          <p:nvPr>
+            <p:ph type="title"/>
+          </p:nvPr>
+        </p:nvSpPr>
+        <p:spPr/>
+        <p:txBody>
+          <a:bodyPr/>
+          <a:lstStyle/>
+          <a:p>
+            <a:r>
+              <a:rPr lang="en-US" sz="4000" dirty="0"/>
+              <a:t>Forms that read too much data or are too complex</a:t>
+            </a:r>
+            <a:endParaRPr lang="nl-BE" sz="4000" dirty="0"/>
+          </a:p>
+        </p:txBody>
+      </p:sp>
+      <p:sp>
+        <p:nvSpPr>
+          <p:cNvPr id="3" name="Text Placeholder 2"/>
+          <p:cNvSpPr>
+            <a:spLocks noGrp="1"/>
+          </p:cNvSpPr>
+          <p:nvPr>
+            <p:ph type="body" sz="quarter" idx="10"/>
+          </p:nvPr>
+        </p:nvSpPr>
+        <p:spPr>
+          <a:xfrm>
+            <a:off x="519112" y="976497"/>
+            <a:ext cx="11149013" cy="2043636"/>
+          </a:xfrm>
+        </p:spPr>
+        <p:txBody>
+          <a:bodyPr/>
+          <a:lstStyle/>
+          <a:p>
+            <a:r>
+              <a:rPr lang="en-US" sz="3200" dirty="0"/>
+              <a:t>Resources:</a:t>
+            </a:r>
+          </a:p>
+          <a:p>
+            <a:pPr lvl="1"/>
+            <a:r>
+              <a:rPr lang="en-US" sz="1800" dirty="0"/>
+              <a:t>The #1 reason for these types of issues, that we have seen, is the amount of data being pulled back to the form. In 2003 and 2007, if you needed data from a SP list/lib, you basically had to pull all the data down to InfoPath and then apply a filter. With the release of 2010 and 2013, there are now “</a:t>
+            </a:r>
+            <a:r>
+              <a:rPr lang="en-US" sz="1800" dirty="0" err="1"/>
+              <a:t>queryFields</a:t>
+            </a:r>
+            <a:r>
+              <a:rPr lang="en-US" sz="1800" dirty="0"/>
+              <a:t>” for SharePoint data connections so you can let the server perform the filtering and only return what you need to InfoPath</a:t>
+            </a:r>
+          </a:p>
+          <a:p>
+            <a:pPr lvl="1"/>
+            <a:r>
+              <a:rPr lang="nl-BE" sz="1800" dirty="0">
+                <a:hlinkClick r:id="rId2"/>
+              </a:rPr>
+              <a:t>https://msdn.microsoft.com/en-us/library/bb380251.aspx</a:t>
+            </a:r>
+            <a:endParaRPr lang="nl-BE" sz="1800" dirty="0"/>
+          </a:p>
+          <a:p>
+            <a:pPr lvl="1"/>
+            <a:r>
+              <a:rPr lang="nl-BE" sz="1800" dirty="0">
+                <a:hlinkClick r:id="rId3"/>
+              </a:rPr>
+              <a:t>https://blogs.msdn.microsoft.com/infopath/2008/05/09/designing-browser-enabled-forms-for-performance-in-infopath-forms-services-part-1</a:t>
+            </a:r>
+            <a:endParaRPr lang="nl-BE" sz="1800" dirty="0"/>
+          </a:p>
+          <a:p>
+            <a:pPr lvl="1"/>
+            <a:r>
+              <a:rPr lang="en-US" sz="1800" u="sng" dirty="0">
+                <a:hlinkClick r:id="rId4"/>
+              </a:rPr>
+              <a:t>https://blogs.msdn.microsoft.com/infopath/2008/05/09/designing-browser-enabled-forms-for-performance-in-infopath-forms-services-part-2</a:t>
+            </a:r>
+            <a:endParaRPr lang="en-US" sz="1800" u="sng" dirty="0"/>
+          </a:p>
+          <a:p>
+            <a:pPr lvl="1"/>
+            <a:r>
+              <a:rPr lang="en-US" sz="1800" u="sng" dirty="0">
+                <a:hlinkClick r:id="rId5"/>
+              </a:rPr>
+              <a:t>https://blogs.msdn.microsoft.com/infopath/2008/05/09/designing-browser-enabled-forms-for-performance-in-infopath-forms-services-part-3</a:t>
+            </a:r>
+            <a:endParaRPr lang="en-US" sz="1800" u="sng" dirty="0"/>
+          </a:p>
+          <a:p>
+            <a:pPr lvl="1"/>
+            <a:r>
+              <a:rPr lang="en-US" sz="1800" u="sng" dirty="0">
+                <a:hlinkClick r:id="rId6"/>
+              </a:rPr>
+              <a:t>https://blogs.msdn.microsoft.com/infopath/2008/05/09/designing-browser-enabled-forms-for-performance-in-infopath-forms-services-part-4</a:t>
+            </a:r>
+            <a:endParaRPr lang="en-US" sz="1800" u="sng" dirty="0"/>
+          </a:p>
+          <a:p>
+            <a:pPr lvl="1"/>
+            <a:r>
+              <a:rPr lang="en-US" sz="1800" u="sng" dirty="0">
+                <a:hlinkClick r:id="rId7"/>
+              </a:rPr>
+              <a:t>https://blogs.msdn.microsoft.com/infopath/2008/05/09/designing-browser-enabled-forms-for-performance-in-infopath-forms-services-part-5</a:t>
+            </a:r>
+            <a:endParaRPr lang="en-US" sz="1800" u="sng" dirty="0"/>
+          </a:p>
+          <a:p>
+            <a:pPr lvl="1"/>
+            <a:r>
+              <a:rPr lang="en-US" sz="1800" u="sng" dirty="0">
+                <a:hlinkClick r:id="rId8"/>
+              </a:rPr>
+              <a:t>https://blogs.msdn.microsoft.com/infopath/2008/05/09/designing-browser-enabled-forms-for-performance-in-infopath-forms-services-part-6</a:t>
+            </a:r>
+            <a:endParaRPr lang="en-US" sz="1800" u="sng" dirty="0"/>
+          </a:p>
+          <a:p>
+            <a:pPr lvl="1"/>
+            <a:endParaRPr lang="nl-BE" sz="1800" dirty="0"/>
+          </a:p>
+        </p:txBody>
+      </p:sp>
+    </p:spTree>
+    <p:extLst>
+      <p:ext uri="{BB962C8B-B14F-4D97-AF65-F5344CB8AC3E}">
+        <p14:creationId xmlns:p14="http://schemas.microsoft.com/office/powerpoint/2010/main" val="1328876743"/>
+      </p:ext>
+    </p:extLst>
+  </p:cSld>
+  <p:clrMapOvr>
+    <a:masterClrMapping/>
+  </p:clrMapOvr>
+  <p:transition>
+    <p:fade/>
+  </p:transition>
+</p:sld>
+</file>
+
+<file path=ppt/slides/slide18.xml><?xml version="1.0" encoding="utf-8"?>
+<p:sld xmlns:a="http://schemas.openxmlformats.org/drawingml/2006/main" xmlns:r="http://schemas.openxmlformats.org/officeDocument/2006/relationships" xmlns:p="http://schemas.openxmlformats.org/presentationml/2006/main">
+  <p:cSld>
+    <p:spTree>
+      <p:nvGrpSpPr>
+        <p:cNvPr id="1" name=""/>
+        <p:cNvGrpSpPr/>
+        <p:nvPr/>
+      </p:nvGrpSpPr>
+      <p:grpSpPr>
+        <a:xfrm>
+          <a:off x="0" y="0"/>
+          <a:ext cx="0" cy="0"/>
+          <a:chOff x="0" y="0"/>
+          <a:chExt cx="0" cy="0"/>
+        </a:xfrm>
+      </p:grpSpPr>
+      <p:sp>
+        <p:nvSpPr>
+          <p:cNvPr id="2" name="Title 1"/>
+          <p:cNvSpPr>
+            <a:spLocks noGrp="1"/>
+          </p:cNvSpPr>
+          <p:nvPr>
+            <p:ph type="title"/>
+          </p:nvPr>
+        </p:nvSpPr>
+        <p:spPr/>
+        <p:txBody>
+          <a:bodyPr/>
+          <a:lstStyle/>
+          <a:p>
+            <a:r>
+              <a:rPr lang="en-US" dirty="0"/>
+              <a:t>Hard coded account references in forms</a:t>
+            </a:r>
+            <a:endParaRPr lang="nl-BE" dirty="0"/>
+          </a:p>
+        </p:txBody>
+      </p:sp>
+      <p:sp>
+        <p:nvSpPr>
+          <p:cNvPr id="3" name="Text Placeholder 2"/>
+          <p:cNvSpPr>
+            <a:spLocks noGrp="1"/>
+          </p:cNvSpPr>
+          <p:nvPr>
+            <p:ph type="body" sz="quarter" idx="10"/>
+          </p:nvPr>
+        </p:nvSpPr>
+        <p:spPr>
+          <a:xfrm>
+            <a:off x="519112" y="1447798"/>
+            <a:ext cx="11149013" cy="4495801"/>
+          </a:xfrm>
+        </p:spPr>
+        <p:txBody>
+          <a:bodyPr/>
+          <a:lstStyle/>
+          <a:p>
+            <a:r>
+              <a:rPr lang="en-US" dirty="0"/>
+              <a:t>Problem:</a:t>
+            </a:r>
+          </a:p>
+          <a:p>
+            <a:pPr lvl="1"/>
+            <a:r>
+              <a:rPr lang="en-US" dirty="0"/>
+              <a:t>Forms can contain hard coded account references in the form of </a:t>
+            </a:r>
+            <a:r>
+              <a:rPr lang="en-US" b="1" dirty="0"/>
+              <a:t>i:0#.w|domain\user </a:t>
+            </a:r>
+            <a:r>
+              <a:rPr lang="en-US" dirty="0"/>
+              <a:t>or </a:t>
+            </a:r>
+            <a:r>
+              <a:rPr lang="en-US" b="1" dirty="0"/>
+              <a:t>domain\user</a:t>
+            </a:r>
+            <a:r>
+              <a:rPr lang="en-US" dirty="0"/>
+              <a:t>. These hard coded values could also be used in rules</a:t>
+            </a:r>
+            <a:endParaRPr lang="en-US" b="1" dirty="0"/>
+          </a:p>
+          <a:p>
+            <a:pPr lvl="1"/>
+            <a:r>
+              <a:rPr lang="en-US" dirty="0"/>
+              <a:t>In </a:t>
+            </a:r>
+            <a:r>
+              <a:rPr lang="en-US" dirty="0" err="1"/>
+              <a:t>DvNext</a:t>
+            </a:r>
+            <a:r>
+              <a:rPr lang="en-US" dirty="0"/>
+              <a:t> / MT this needs to be converted to the following </a:t>
+            </a:r>
+            <a:r>
+              <a:rPr lang="en-US" b="1" dirty="0"/>
+              <a:t>i:0#.f|membership|user@domain </a:t>
+            </a:r>
+          </a:p>
+          <a:p>
+            <a:r>
+              <a:rPr lang="en-US" dirty="0"/>
+              <a:t>Advice:</a:t>
+            </a:r>
+          </a:p>
+          <a:p>
+            <a:pPr lvl="1"/>
+            <a:r>
+              <a:rPr lang="en-US" dirty="0"/>
+              <a:t>If the hard coded reference actually should be the current user then replace with the </a:t>
+            </a:r>
+            <a:r>
+              <a:rPr lang="en-US" dirty="0" err="1"/>
+              <a:t>userName</a:t>
+            </a:r>
+            <a:r>
+              <a:rPr lang="en-US" dirty="0"/>
+              <a:t>() function and republish the form</a:t>
+            </a:r>
+          </a:p>
+          <a:p>
+            <a:pPr lvl="1"/>
+            <a:r>
+              <a:rPr lang="en-US" dirty="0"/>
+              <a:t>In all other cases change the hard coded value into the new model and republish the form</a:t>
+            </a:r>
+          </a:p>
+          <a:p>
+            <a:pPr lvl="1"/>
+            <a:r>
+              <a:rPr lang="en-US" dirty="0"/>
+              <a:t>If needed fix rules that have a dependency on the user reference</a:t>
+            </a:r>
+            <a:endParaRPr lang="nl-BE" dirty="0"/>
+          </a:p>
+        </p:txBody>
+      </p:sp>
+    </p:spTree>
+    <p:extLst>
+      <p:ext uri="{BB962C8B-B14F-4D97-AF65-F5344CB8AC3E}">
+        <p14:creationId xmlns:p14="http://schemas.microsoft.com/office/powerpoint/2010/main" val="3247217968"/>
+      </p:ext>
+    </p:extLst>
+  </p:cSld>
+  <p:clrMapOvr>
+    <a:masterClrMapping/>
+  </p:clrMapOvr>
+  <p:transition>
+    <p:fade/>
+  </p:transition>
+</p:sld>
+</file>
+
+<file path=ppt/slides/slide19.xml><?xml version="1.0" encoding="utf-8"?>
+<p:sld xmlns:a="http://schemas.openxmlformats.org/drawingml/2006/main" xmlns:r="http://schemas.openxmlformats.org/officeDocument/2006/relationships" xmlns:p="http://schemas.openxmlformats.org/presentationml/2006/main">
+  <p:cSld>
+    <p:spTree>
+      <p:nvGrpSpPr>
+        <p:cNvPr id="1" name=""/>
+        <p:cNvGrpSpPr/>
+        <p:nvPr/>
+      </p:nvGrpSpPr>
+      <p:grpSpPr>
+        <a:xfrm>
+          <a:off x="0" y="0"/>
+          <a:ext cx="0" cy="0"/>
+          <a:chOff x="0" y="0"/>
+          <a:chExt cx="0" cy="0"/>
+        </a:xfrm>
+      </p:grpSpPr>
+      <p:sp>
+        <p:nvSpPr>
+          <p:cNvPr id="2" name="Title 1"/>
+          <p:cNvSpPr>
+            <a:spLocks noGrp="1"/>
+          </p:cNvSpPr>
+          <p:nvPr>
+            <p:ph type="title"/>
+          </p:nvPr>
+        </p:nvSpPr>
+        <p:spPr/>
+        <p:txBody>
+          <a:bodyPr/>
+          <a:lstStyle/>
+          <a:p>
+            <a:r>
+              <a:rPr lang="en-US" dirty="0"/>
+              <a:t>Forms calling into SPO rest service when being filled via the InfoPath client</a:t>
+            </a:r>
+            <a:endParaRPr lang="nl-BE" dirty="0"/>
+          </a:p>
+        </p:txBody>
+      </p:sp>
+      <p:sp>
+        <p:nvSpPr>
+          <p:cNvPr id="3" name="Text Placeholder 2"/>
+          <p:cNvSpPr>
+            <a:spLocks noGrp="1"/>
+          </p:cNvSpPr>
+          <p:nvPr>
+            <p:ph type="body" sz="quarter" idx="10"/>
+          </p:nvPr>
+        </p:nvSpPr>
+        <p:spPr>
+          <a:xfrm>
+            <a:off x="519112" y="2175587"/>
+            <a:ext cx="11149013" cy="2043636"/>
+          </a:xfrm>
+        </p:spPr>
+        <p:txBody>
+          <a:bodyPr/>
+          <a:lstStyle/>
+          <a:p>
+            <a:r>
+              <a:rPr lang="en-US" dirty="0"/>
+              <a:t>Problem:</a:t>
+            </a:r>
+          </a:p>
+          <a:p>
+            <a:pPr lvl="1"/>
+            <a:r>
+              <a:rPr lang="en-US" dirty="0"/>
+              <a:t>There’s a bug in InfoPath 2013 client that results in an authentication issue when a SharePoint Online REST endpoint is called from a form being filled by InfoPath client. This issue was discovered in </a:t>
+            </a:r>
+            <a:r>
+              <a:rPr lang="en-US"/>
+              <a:t>March 2016</a:t>
+            </a:r>
+            <a:endParaRPr lang="en-US" dirty="0"/>
+          </a:p>
+          <a:p>
+            <a:pPr lvl="1"/>
+            <a:r>
+              <a:rPr lang="en-US" dirty="0"/>
+              <a:t>Note that these REST calls also do not work for forms filled via the browser (InfoPath Form Services)</a:t>
+            </a:r>
+          </a:p>
+          <a:p>
+            <a:r>
+              <a:rPr lang="en-US" dirty="0"/>
+              <a:t>Advice:</a:t>
+            </a:r>
+          </a:p>
+          <a:p>
+            <a:pPr lvl="1"/>
+            <a:r>
+              <a:rPr lang="en-US" dirty="0"/>
+              <a:t>Avoid calling SharePoint Online REST endpoints by either:</a:t>
+            </a:r>
+          </a:p>
+          <a:p>
+            <a:pPr lvl="2"/>
+            <a:r>
+              <a:rPr lang="en-US" dirty="0"/>
+              <a:t>Using one of the </a:t>
+            </a:r>
+            <a:r>
+              <a:rPr lang="en-US" dirty="0">
+                <a:hlinkClick r:id="rId2"/>
+              </a:rPr>
+              <a:t>10 supported ASMX SOAP service endpoints</a:t>
+            </a:r>
+            <a:r>
+              <a:rPr lang="en-US" dirty="0"/>
+              <a:t> instead</a:t>
+            </a:r>
+          </a:p>
+          <a:p>
+            <a:pPr lvl="2"/>
+            <a:r>
+              <a:rPr lang="en-US" dirty="0"/>
+              <a:t>By </a:t>
+            </a:r>
+            <a:r>
+              <a:rPr lang="en-US" dirty="0">
+                <a:hlinkClick r:id="rId3"/>
+              </a:rPr>
+              <a:t>building a proxy </a:t>
+            </a:r>
+            <a:r>
+              <a:rPr lang="en-US" dirty="0"/>
+              <a:t>for the service you need</a:t>
+            </a:r>
+          </a:p>
+          <a:p>
+            <a:endParaRPr lang="nl-BE" dirty="0"/>
+          </a:p>
+        </p:txBody>
+      </p:sp>
+    </p:spTree>
+    <p:extLst>
+      <p:ext uri="{BB962C8B-B14F-4D97-AF65-F5344CB8AC3E}">
+        <p14:creationId xmlns:p14="http://schemas.microsoft.com/office/powerpoint/2010/main" val="1169916408"/>
+      </p:ext>
+    </p:extLst>
+  </p:cSld>
+  <p:clrMapOvr>
+    <a:masterClrMapping/>
+  </p:clrMapOvr>
+  <p:transition>
+    <p:fade/>
+  </p:transition>
 </p:sld>
 </file>
 
@@ -12451,6 +13111,326 @@
 </p:sld>
 </file>
 
+<file path=ppt/slides/slide20.xml><?xml version="1.0" encoding="utf-8"?>
+<p:sld xmlns:a="http://schemas.openxmlformats.org/drawingml/2006/main" xmlns:r="http://schemas.openxmlformats.org/officeDocument/2006/relationships" xmlns:p="http://schemas.openxmlformats.org/presentationml/2006/main">
+  <p:cSld>
+    <p:spTree>
+      <p:nvGrpSpPr>
+        <p:cNvPr id="1" name=""/>
+        <p:cNvGrpSpPr/>
+        <p:nvPr/>
+      </p:nvGrpSpPr>
+      <p:grpSpPr>
+        <a:xfrm>
+          <a:off x="0" y="0"/>
+          <a:ext cx="0" cy="0"/>
+          <a:chOff x="0" y="0"/>
+          <a:chExt cx="0" cy="0"/>
+        </a:xfrm>
+      </p:grpSpPr>
+      <p:sp>
+        <p:nvSpPr>
+          <p:cNvPr id="2" name="Title 1"/>
+          <p:cNvSpPr>
+            <a:spLocks noGrp="1"/>
+          </p:cNvSpPr>
+          <p:nvPr>
+            <p:ph type="title"/>
+          </p:nvPr>
+        </p:nvSpPr>
+        <p:spPr/>
+        <p:txBody>
+          <a:bodyPr/>
+          <a:lstStyle/>
+          <a:p>
+            <a:r>
+              <a:rPr lang="en-US" dirty="0"/>
+              <a:t>Form is showing wrong date time</a:t>
+            </a:r>
+            <a:endParaRPr lang="nl-BE" dirty="0"/>
+          </a:p>
+        </p:txBody>
+      </p:sp>
+      <p:sp>
+        <p:nvSpPr>
+          <p:cNvPr id="3" name="Text Placeholder 2"/>
+          <p:cNvSpPr>
+            <a:spLocks noGrp="1"/>
+          </p:cNvSpPr>
+          <p:nvPr>
+            <p:ph type="body" sz="quarter" idx="10"/>
+          </p:nvPr>
+        </p:nvSpPr>
+        <p:spPr/>
+        <p:txBody>
+          <a:bodyPr/>
+          <a:lstStyle/>
+          <a:p>
+            <a:r>
+              <a:rPr lang="en-US" dirty="0"/>
+              <a:t>Problem:</a:t>
+            </a:r>
+          </a:p>
+          <a:p>
+            <a:pPr lvl="1"/>
+            <a:r>
+              <a:rPr lang="en-US" dirty="0"/>
+              <a:t>Forms rendered on the server using InfoPath Form Services default date time to the server time zone setting and not the site collection time zone setting</a:t>
+            </a:r>
+          </a:p>
+          <a:p>
+            <a:r>
+              <a:rPr lang="en-US" dirty="0"/>
+              <a:t>Advice:</a:t>
+            </a:r>
+          </a:p>
+          <a:p>
+            <a:pPr lvl="1"/>
+            <a:r>
+              <a:rPr lang="en-US" dirty="0"/>
+              <a:t>Do not use the date picker autofill but use a formula to adjust date and time:</a:t>
+            </a:r>
+          </a:p>
+          <a:p>
+            <a:pPr lvl="2"/>
+            <a:r>
+              <a:rPr lang="nl-BE" dirty="0" err="1"/>
+              <a:t>addDays</a:t>
+            </a:r>
+            <a:r>
+              <a:rPr lang="nl-BE" dirty="0"/>
+              <a:t>(date, </a:t>
+            </a:r>
+            <a:r>
+              <a:rPr lang="nl-BE" dirty="0" err="1"/>
+              <a:t>days</a:t>
+            </a:r>
+            <a:r>
+              <a:rPr lang="nl-BE" dirty="0"/>
+              <a:t>)</a:t>
+            </a:r>
+          </a:p>
+          <a:p>
+            <a:pPr lvl="2"/>
+            <a:r>
+              <a:rPr lang="nl-BE" dirty="0" err="1"/>
+              <a:t>addSeconds</a:t>
+            </a:r>
+            <a:r>
+              <a:rPr lang="nl-BE" dirty="0"/>
+              <a:t>(time, </a:t>
+            </a:r>
+            <a:r>
+              <a:rPr lang="nl-BE" dirty="0" err="1"/>
+              <a:t>seconds</a:t>
+            </a:r>
+            <a:r>
+              <a:rPr lang="nl-BE" dirty="0"/>
+              <a:t>)</a:t>
+            </a:r>
+          </a:p>
+          <a:p>
+            <a:pPr lvl="2"/>
+            <a:endParaRPr lang="nl-BE" dirty="0"/>
+          </a:p>
+        </p:txBody>
+      </p:sp>
+    </p:spTree>
+    <p:extLst>
+      <p:ext uri="{BB962C8B-B14F-4D97-AF65-F5344CB8AC3E}">
+        <p14:creationId xmlns:p14="http://schemas.microsoft.com/office/powerpoint/2010/main" val="3155062209"/>
+      </p:ext>
+    </p:extLst>
+  </p:cSld>
+  <p:clrMapOvr>
+    <a:masterClrMapping/>
+  </p:clrMapOvr>
+  <p:transition>
+    <p:fade/>
+  </p:transition>
+</p:sld>
+</file>
+
+<file path=ppt/slides/slide21.xml><?xml version="1.0" encoding="utf-8"?>
+<p:sld xmlns:a="http://schemas.openxmlformats.org/drawingml/2006/main" xmlns:r="http://schemas.openxmlformats.org/officeDocument/2006/relationships" xmlns:p="http://schemas.openxmlformats.org/presentationml/2006/main">
+  <p:cSld>
+    <p:spTree>
+      <p:nvGrpSpPr>
+        <p:cNvPr id="1" name=""/>
+        <p:cNvGrpSpPr/>
+        <p:nvPr/>
+      </p:nvGrpSpPr>
+      <p:grpSpPr>
+        <a:xfrm>
+          <a:off x="0" y="0"/>
+          <a:ext cx="0" cy="0"/>
+          <a:chOff x="0" y="0"/>
+          <a:chExt cx="0" cy="0"/>
+        </a:xfrm>
+      </p:grpSpPr>
+    </p:spTree>
+    <p:extLst>
+      <p:ext uri="{BB962C8B-B14F-4D97-AF65-F5344CB8AC3E}">
+        <p14:creationId xmlns:p14="http://schemas.microsoft.com/office/powerpoint/2010/main" val="2958316264"/>
+      </p:ext>
+    </p:extLst>
+  </p:cSld>
+  <p:clrMapOvr>
+    <a:masterClrMapping/>
+  </p:clrMapOvr>
+  <p:transition>
+    <p:fade/>
+  </p:transition>
+</p:sld>
+</file>
+
+<file path=ppt/slides/slide22.xml><?xml version="1.0" encoding="utf-8"?>
+<p:sld xmlns:a="http://schemas.openxmlformats.org/drawingml/2006/main" xmlns:r="http://schemas.openxmlformats.org/officeDocument/2006/relationships" xmlns:p="http://schemas.openxmlformats.org/presentationml/2006/main">
+  <p:cSld>
+    <p:spTree>
+      <p:nvGrpSpPr>
+        <p:cNvPr id="1" name=""/>
+        <p:cNvGrpSpPr/>
+        <p:nvPr/>
+      </p:nvGrpSpPr>
+      <p:grpSpPr>
+        <a:xfrm>
+          <a:off x="0" y="0"/>
+          <a:ext cx="0" cy="0"/>
+          <a:chOff x="0" y="0"/>
+          <a:chExt cx="0" cy="0"/>
+        </a:xfrm>
+      </p:grpSpPr>
+      <p:sp>
+        <p:nvSpPr>
+          <p:cNvPr id="3" name="Text Box 3"/>
+          <p:cNvSpPr txBox="1">
+            <a:spLocks noChangeArrowheads="1"/>
+          </p:cNvSpPr>
+          <p:nvPr/>
+        </p:nvSpPr>
+        <p:spPr bwMode="blackWhite">
+          <a:xfrm>
+            <a:off x="267614" y="5959359"/>
+            <a:ext cx="10755853" cy="606312"/>
+          </a:xfrm>
+          <a:prstGeom prst="rect">
+            <a:avLst/>
+          </a:prstGeom>
+          <a:noFill/>
+          <a:ln w="12700">
+            <a:noFill/>
+            <a:miter lim="800000"/>
+            <a:headEnd type="none" w="sm" len="sm"/>
+            <a:tailEnd type="none" w="sm" len="sm"/>
+          </a:ln>
+          <a:effectLst/>
+        </p:spPr>
+        <p:txBody>
+          <a:bodyPr vert="horz" wrap="square" lIns="179238" tIns="143391" rIns="179238" bIns="143391" numCol="1" anchor="t" anchorCtr="0" compatLnSpc="1">
+            <a:prstTxWarp prst="textNoShape">
+              <a:avLst/>
+            </a:prstTxWarp>
+            <a:spAutoFit/>
+          </a:bodyPr>
+          <a:lstStyle/>
+          <a:p>
+            <a:pPr defTabSz="913737" eaLnBrk="0" hangingPunct="0"/>
+            <a:r>
+              <a:rPr lang="en-US" sz="686" dirty="0">
+                <a:gradFill>
+                  <a:gsLst>
+                    <a:gs pos="0">
+                      <a:srgbClr val="FFFFFF"/>
+                    </a:gs>
+                    <a:gs pos="100000">
+                      <a:srgbClr val="FFFFFF"/>
+                    </a:gs>
+                  </a:gsLst>
+                  <a:lin ang="5400000" scaled="0"/>
+                </a:gradFill>
+                <a:cs typeface="Segoe UI" pitchFamily="34" charset="0"/>
+              </a:rPr>
+              <a:t>© 2014 Microsoft Corporation. All rights reserved. Microsoft, Windows, Windows Vista and other product names are or may be registered trademarks and/or trademarks in the U.S. and/or other countries.</a:t>
+            </a:r>
+          </a:p>
+          <a:p>
+            <a:pPr defTabSz="913737" eaLnBrk="0" hangingPunct="0"/>
+            <a:r>
+              <a:rPr lang="en-US" sz="686" dirty="0">
+                <a:gradFill>
+                  <a:gsLst>
+                    <a:gs pos="0">
+                      <a:srgbClr val="FFFFFF"/>
+                    </a:gs>
+                    <a:gs pos="100000">
+                      <a:srgbClr val="FFFFFF"/>
+                    </a:gs>
+                  </a:gsLst>
+                  <a:lin ang="5400000" scaled="0"/>
+                </a:gradFill>
+                <a:cs typeface="Segoe UI" pitchFamily="34" charset="0"/>
+              </a:rPr>
+              <a:t>The information herein is for informational purposes only and represents the current view of Microsoft Corporation as of the date of this presentation.  Because Microsoft must respond to changing market conditions, it should not be interpreted to be a commitment on the part of Microsoft, and Microsoft cannot guarantee the accuracy of any information provided after the date of this presentation.  MICROSOFT MAKES NO WARRANTIES, EXPRESS, IMPLIED OR STATUTORY, AS TO THE INFORMATION IN THIS PRESENTATION.</a:t>
+            </a:r>
+          </a:p>
+        </p:txBody>
+      </p:sp>
+      <p:pic>
+        <p:nvPicPr>
+          <p:cNvPr id="2" name="Picture 1"/>
+          <p:cNvPicPr>
+            <a:picLocks noChangeAspect="1"/>
+          </p:cNvPicPr>
+          <p:nvPr/>
+        </p:nvPicPr>
+        <p:blipFill>
+          <a:blip r:embed="rId3">
+            <a:extLst>
+              <a:ext uri="{28A0092B-C50C-407E-A947-70E740481C1C}">
+                <a14:useLocalDpi xmlns:a14="http://schemas.microsoft.com/office/drawing/2010/main" val="0"/>
+              </a:ext>
+            </a:extLst>
+          </a:blip>
+          <a:stretch>
+            <a:fillRect/>
+          </a:stretch>
+        </p:blipFill>
+        <p:spPr bwMode="invGray">
+          <a:xfrm>
+            <a:off x="450085" y="3083792"/>
+            <a:ext cx="3223021" cy="690417"/>
+          </a:xfrm>
+          <a:prstGeom prst="rect">
+            <a:avLst/>
+          </a:prstGeom>
+        </p:spPr>
+      </p:pic>
+    </p:spTree>
+    <p:extLst>
+      <p:ext uri="{BB962C8B-B14F-4D97-AF65-F5344CB8AC3E}">
+        <p14:creationId xmlns:p14="http://schemas.microsoft.com/office/powerpoint/2010/main" val="4060165635"/>
+      </p:ext>
+    </p:extLst>
+  </p:cSld>
+  <p:clrMapOvr>
+    <a:masterClrMapping/>
+  </p:clrMapOvr>
+  <mc:AlternateContent xmlns:mc="http://schemas.openxmlformats.org/markup-compatibility/2006" xmlns:p14="http://schemas.microsoft.com/office/powerpoint/2010/main">
+    <mc:Choice Requires="p14">
+      <p:transition spd="med" p14:dur="700">
+        <p:fade/>
+      </p:transition>
+    </mc:Choice>
+    <mc:Fallback xmlns="">
+      <p:transition spd="med">
+        <p:fade/>
+      </p:transition>
+    </mc:Fallback>
+  </mc:AlternateContent>
+</p:sld>
+</file>
+
 <file path=ppt/slides/slide3.xml><?xml version="1.0" encoding="utf-8"?>
 <p:sld xmlns:a="http://schemas.openxmlformats.org/drawingml/2006/main" xmlns:r="http://schemas.openxmlformats.org/officeDocument/2006/relationships" xmlns:p="http://schemas.openxmlformats.org/presentationml/2006/main">
   <p:cSld>
@@ -12514,6 +13494,12 @@
             <a:r>
               <a:rPr lang="en-US" dirty="0"/>
               <a:t>Fixing authentication via UDCX files</a:t>
+            </a:r>
+          </a:p>
+          <a:p>
+            <a:r>
+              <a:rPr lang="en-US" dirty="0"/>
+              <a:t>Fixing user data in migrated InfoPath files</a:t>
             </a:r>
           </a:p>
           <a:p>
@@ -12674,17 +13660,7 @@
             </a:r>
             <a:r>
               <a:rPr lang="en-US" dirty="0"/>
-              <a:t>/MT the </a:t>
-            </a:r>
-            <a:r>
-              <a:rPr lang="en-US" dirty="0">
-                <a:hlinkClick r:id="rId2"/>
-              </a:rPr>
-              <a:t>10 supported OOB web service calls</a:t>
-            </a:r>
-            <a:r>
-              <a:rPr lang="en-US" dirty="0"/>
-              <a:t> only work when they do not use the UDCX file or when there’s no authentication information in the UDCX file</a:t>
+              <a:t>/MT the 10 supported OOB web service calls only work when they do not use the UDCX file or when there’s no authentication information in the UDCX file</a:t>
             </a:r>
             <a:endParaRPr lang="nl-BE" dirty="0"/>
           </a:p>
@@ -17157,8 +18133,17 @@
 </file>
 
 <file path=customXml/item1.xml><?xml version="1.0" encoding="utf-8"?>
-<ct:contentTypeSchema xmlns:ct="http://schemas.microsoft.com/office/2006/metadata/contentType" xmlns:ma="http://schemas.microsoft.com/office/2006/metadata/properties/metaAttributes" ct:_="" ma:_="" ma:contentTypeName="Document" ma:contentTypeID="0x010100DD7BFE2324FCFB49A665688E9D54E8DB" ma:contentTypeVersion="3" ma:contentTypeDescription="Create a new document." ma:contentTypeScope="" ma:versionID="4d195f25be3b1b106d09dd5eb39adb0f">
-  <xsd:schema xmlns:xsd="http://www.w3.org/2001/XMLSchema" xmlns:xs="http://www.w3.org/2001/XMLSchema" xmlns:p="http://schemas.microsoft.com/office/2006/metadata/properties" xmlns:ns2="5ec9502b-addf-4716-883a-9e6742fd5109" targetNamespace="http://schemas.microsoft.com/office/2006/metadata/properties" ma:root="true" ma:fieldsID="e57dfefa7c7616ba09ddcfd309c2667f" ns2:_="">
+<?mso-contentType ?>
+<FormTemplates xmlns="http://schemas.microsoft.com/sharepoint/v3/contenttype/forms">
+  <Display>DocumentLibraryForm</Display>
+  <Edit>DocumentLibraryForm</Edit>
+  <New>DocumentLibraryForm</New>
+</FormTemplates>
+</file>
+
+<file path=customXml/item2.xml><?xml version="1.0" encoding="utf-8"?>
+<ct:contentTypeSchema xmlns:ct="http://schemas.microsoft.com/office/2006/metadata/contentType" xmlns:ma="http://schemas.microsoft.com/office/2006/metadata/properties/metaAttributes" ct:_="" ma:_="" ma:contentTypeName="Document" ma:contentTypeID="0x010100DD7BFE2324FCFB49A665688E9D54E8DB" ma:contentTypeVersion="3" ma:contentTypeDescription="Create a new document." ma:contentTypeScope="" ma:versionID="e2df71f908f08602d73af1545e85ca72">
+  <xsd:schema xmlns:xsd="http://www.w3.org/2001/XMLSchema" xmlns:xs="http://www.w3.org/2001/XMLSchema" xmlns:p="http://schemas.microsoft.com/office/2006/metadata/properties" xmlns:ns2="5ec9502b-addf-4716-883a-9e6742fd5109" targetNamespace="http://schemas.microsoft.com/office/2006/metadata/properties" ma:root="true" ma:fieldsID="89260c093ecc6beccd23aa6703f8249f" ns2:_="">
     <xsd:import namespace="5ec9502b-addf-4716-883a-9e6742fd5109"/>
     <xsd:element name="properties">
       <xsd:complexType>
@@ -17310,15 +18295,6 @@
 </ct:contentTypeSchema>
 </file>
 
-<file path=customXml/item2.xml><?xml version="1.0" encoding="utf-8"?>
-<?mso-contentType ?>
-<FormTemplates xmlns="http://schemas.microsoft.com/sharepoint/v3/contenttype/forms">
-  <Display>DocumentLibraryForm</Display>
-  <Edit>DocumentLibraryForm</Edit>
-  <New>DocumentLibraryForm</New>
-</FormTemplates>
-</file>
-
 <file path=customXml/item3.xml><?xml version="1.0" encoding="utf-8"?>
 <Control xmlns="http://schemas.microsoft.com/VisualStudio/2011/storyboarding/control">
   <Id Name="System.Storyboarding.Backgrounds.WebBrowser" Revision="1" Stencil="System.Storyboarding.Backgrounds" StencilVersion="0.1"/>
@@ -17326,12 +18302,6 @@
 </file>
 
 <file path=customXml/item4.xml><?xml version="1.0" encoding="utf-8"?>
-<Control xmlns="http://schemas.microsoft.com/VisualStudio/2011/storyboarding/control">
-  <Id Name="System.Storyboarding.Backgrounds.WebBrowser" Revision="1" Stencil="System.Storyboarding.Backgrounds" StencilVersion="0.1"/>
-</Control>
-</file>
-
-<file path=customXml/item5.xml><?xml version="1.0" encoding="utf-8"?>
 <p:properties xmlns:p="http://schemas.microsoft.com/office/2006/metadata/properties" xmlns:xsi="http://www.w3.org/2001/XMLSchema-instance" xmlns:pc="http://schemas.microsoft.com/office/infopath/2007/PartnerControls">
   <documentManagement>
     <SharedWithUsers xmlns="5ec9502b-addf-4716-883a-9e6742fd5109">
@@ -17345,6 +18315,12 @@
 </p:properties>
 </file>
 
+<file path=customXml/item5.xml><?xml version="1.0" encoding="utf-8"?>
+<Control xmlns="http://schemas.microsoft.com/VisualStudio/2011/storyboarding/control">
+  <Id Name="System.Storyboarding.Backgrounds.WebBrowser" Revision="1" Stencil="System.Storyboarding.Backgrounds" StencilVersion="0.1"/>
+</Control>
+</file>
+
 <file path=customXml/item6.xml><?xml version="1.0" encoding="utf-8"?>
 <Control xmlns="http://schemas.microsoft.com/VisualStudio/2011/storyboarding/control">
   <Id Name="System.Storyboarding.Backgrounds.WebBrowser" Revision="1" Stencil="System.Storyboarding.Backgrounds" StencilVersion="0.1"/>
@@ -17352,7 +18328,15 @@
 </file>
 
 <file path=customXml/itemProps1.xml><?xml version="1.0" encoding="utf-8"?>
-<ds:datastoreItem xmlns:ds="http://schemas.openxmlformats.org/officeDocument/2006/customXml" ds:itemID="{FE42A291-597C-4158-92E5-5380D61C446D}">
+<ds:datastoreItem xmlns:ds="http://schemas.openxmlformats.org/officeDocument/2006/customXml" ds:itemID="{B4606E04-852E-4880-8CD1-0B186F4087B1}">
+  <ds:schemaRefs>
+    <ds:schemaRef ds:uri="http://schemas.microsoft.com/sharepoint/v3/contenttype/forms"/>
+  </ds:schemaRefs>
+</ds:datastoreItem>
+</file>
+
+<file path=customXml/itemProps2.xml><?xml version="1.0" encoding="utf-8"?>
+<ds:datastoreItem xmlns:ds="http://schemas.openxmlformats.org/officeDocument/2006/customXml" ds:itemID="{F9995C7B-D0AF-4C77-9DB7-FC5B0BF9FC9F}">
   <ds:schemaRefs>
     <ds:schemaRef ds:uri="http://schemas.microsoft.com/office/2006/metadata/contentType"/>
     <ds:schemaRef ds:uri="http://schemas.microsoft.com/office/2006/metadata/properties/metaAttributes"/>
@@ -17369,16 +18353,8 @@
 </ds:datastoreItem>
 </file>
 
-<file path=customXml/itemProps2.xml><?xml version="1.0" encoding="utf-8"?>
-<ds:datastoreItem xmlns:ds="http://schemas.openxmlformats.org/officeDocument/2006/customXml" ds:itemID="{B4606E04-852E-4880-8CD1-0B186F4087B1}">
-  <ds:schemaRefs>
-    <ds:schemaRef ds:uri="http://schemas.microsoft.com/sharepoint/v3/contenttype/forms"/>
-  </ds:schemaRefs>
-</ds:datastoreItem>
-</file>
-
 <file path=customXml/itemProps3.xml><?xml version="1.0" encoding="utf-8"?>
-<ds:datastoreItem xmlns:ds="http://schemas.openxmlformats.org/officeDocument/2006/customXml" ds:itemID="{6769EEFD-0F61-4AA2-AE02-4E16ED5BCFE8}">
+<ds:datastoreItem xmlns:ds="http://schemas.openxmlformats.org/officeDocument/2006/customXml" ds:itemID="{57ED2E3B-EB43-4252-8C73-98EA6ACC344E}">
   <ds:schemaRefs>
     <ds:schemaRef ds:uri="http://schemas.microsoft.com/VisualStudio/2011/storyboarding/control"/>
   </ds:schemaRefs>
@@ -17386,6 +18362,22 @@
 </file>
 
 <file path=customXml/itemProps4.xml><?xml version="1.0" encoding="utf-8"?>
+<ds:datastoreItem xmlns:ds="http://schemas.openxmlformats.org/officeDocument/2006/customXml" ds:itemID="{F1AEA8A7-A694-4DB0-82AB-EF48F2E9B6F9}">
+  <ds:schemaRefs>
+    <ds:schemaRef ds:uri="http://purl.org/dc/elements/1.1/"/>
+    <ds:schemaRef ds:uri="http://schemas.microsoft.com/office/2006/documentManagement/types"/>
+    <ds:schemaRef ds:uri="http://purl.org/dc/terms/"/>
+    <ds:schemaRef ds:uri="http://schemas.openxmlformats.org/package/2006/metadata/core-properties"/>
+    <ds:schemaRef ds:uri="5ec9502b-addf-4716-883a-9e6742fd5109"/>
+    <ds:schemaRef ds:uri="http://purl.org/dc/dcmitype/"/>
+    <ds:schemaRef ds:uri="http://schemas.microsoft.com/office/infopath/2007/PartnerControls"/>
+    <ds:schemaRef ds:uri="http://schemas.microsoft.com/office/2006/metadata/properties"/>
+    <ds:schemaRef ds:uri="http://www.w3.org/XML/1998/namespace"/>
+  </ds:schemaRefs>
+</ds:datastoreItem>
+</file>
+
+<file path=customXml/itemProps5.xml><?xml version="1.0" encoding="utf-8"?>
 <ds:datastoreItem xmlns:ds="http://schemas.openxmlformats.org/officeDocument/2006/customXml" ds:itemID="{CE030D2D-A334-4C40-95AD-E97580D89B11}">
   <ds:schemaRefs>
     <ds:schemaRef ds:uri="http://schemas.microsoft.com/VisualStudio/2011/storyboarding/control"/>
@@ -17393,24 +18385,8 @@
 </ds:datastoreItem>
 </file>
 
-<file path=customXml/itemProps5.xml><?xml version="1.0" encoding="utf-8"?>
-<ds:datastoreItem xmlns:ds="http://schemas.openxmlformats.org/officeDocument/2006/customXml" ds:itemID="{F1AEA8A7-A694-4DB0-82AB-EF48F2E9B6F9}">
-  <ds:schemaRefs>
-    <ds:schemaRef ds:uri="5ec9502b-addf-4716-883a-9e6742fd5109"/>
-    <ds:schemaRef ds:uri="http://purl.org/dc/dcmitype/"/>
-    <ds:schemaRef ds:uri="http://schemas.microsoft.com/office/infopath/2007/PartnerControls"/>
-    <ds:schemaRef ds:uri="http://schemas.microsoft.com/office/2006/documentManagement/types"/>
-    <ds:schemaRef ds:uri="http://purl.org/dc/elements/1.1/"/>
-    <ds:schemaRef ds:uri="http://schemas.microsoft.com/office/2006/metadata/properties"/>
-    <ds:schemaRef ds:uri="http://purl.org/dc/terms/"/>
-    <ds:schemaRef ds:uri="http://schemas.openxmlformats.org/package/2006/metadata/core-properties"/>
-    <ds:schemaRef ds:uri="http://www.w3.org/XML/1998/namespace"/>
-  </ds:schemaRefs>
-</ds:datastoreItem>
-</file>
-
 <file path=customXml/itemProps6.xml><?xml version="1.0" encoding="utf-8"?>
-<ds:datastoreItem xmlns:ds="http://schemas.openxmlformats.org/officeDocument/2006/customXml" ds:itemID="{57ED2E3B-EB43-4252-8C73-98EA6ACC344E}">
+<ds:datastoreItem xmlns:ds="http://schemas.openxmlformats.org/officeDocument/2006/customXml" ds:itemID="{6769EEFD-0F61-4AA2-AE02-4E16ED5BCFE8}">
   <ds:schemaRefs>
     <ds:schemaRef ds:uri="http://schemas.microsoft.com/VisualStudio/2011/storyboarding/control"/>
   </ds:schemaRefs>

</xml_diff>

<commit_message>
Adding references to https://support.microsoft.com/en-us/help/4017854
</commit_message>
<xml_diff>
--- a/InfoPath/Guidance/Decks/Office 365 JDP InfoPath - Post migration guidance.pptx
+++ b/InfoPath/Guidance/Decks/Office 365 JDP InfoPath - Post migration guidance.pptx
@@ -356,7 +356,7 @@
           <a:p>
             <a:fld id="{DE219B1A-AE41-483B-A766-69B9363DDA6A}" type="datetimeFigureOut">
               <a:rPr lang="en-US" smtClean="0"/>
-              <a:t>4/8/2016</a:t>
+              <a:t>4/19/2017</a:t>
             </a:fld>
             <a:endParaRPr lang="en-US"/>
           </a:p>
@@ -565,7 +565,7 @@
           <a:p>
             <a:fld id="{D51B1278-D92B-4AF3-A9C1-71DD298190CE}" type="datetimeFigureOut">
               <a:rPr lang="en-US" smtClean="0"/>
-              <a:t>4/8/2016</a:t>
+              <a:t>4/19/2017</a:t>
             </a:fld>
             <a:endParaRPr lang="en-US"/>
           </a:p>
@@ -1008,7 +1008,7 @@
                 </a:solidFill>
               </a:rPr>
               <a:pPr/>
-              <a:t>4/8/2016</a:t>
+              <a:t>4/19/2017</a:t>
             </a:fld>
             <a:endParaRPr lang="en-US" dirty="0">
               <a:solidFill>
@@ -12163,28 +12163,44 @@
           <a:lstStyle/>
           <a:p>
             <a:r>
-              <a:rPr lang="en-US" dirty="0"/>
+              <a:rPr lang="en-US" sz="3600" dirty="0"/>
               <a:t>Forms that read too much data or are too complex</a:t>
             </a:r>
           </a:p>
           <a:p>
             <a:r>
-              <a:rPr lang="en-US" dirty="0"/>
+              <a:rPr lang="en-US" sz="3600" dirty="0"/>
               <a:t>Hard coded account references in forms</a:t>
             </a:r>
           </a:p>
           <a:p>
             <a:r>
-              <a:rPr lang="en-US" dirty="0"/>
+              <a:rPr lang="en-US" sz="3600" dirty="0"/>
               <a:t>Forms calling into SPO rest service when being filled via the InfoPath client</a:t>
             </a:r>
           </a:p>
           <a:p>
             <a:r>
-              <a:rPr lang="en-US" dirty="0"/>
+              <a:rPr lang="en-US" sz="3600" dirty="0"/>
               <a:t>Form is showing wrong date time</a:t>
             </a:r>
-            <a:endParaRPr lang="nl-BE" dirty="0"/>
+          </a:p>
+          <a:p>
+            <a:r>
+              <a:rPr lang="en-US" sz="3600" dirty="0"/>
+              <a:t>See </a:t>
+            </a:r>
+            <a:r>
+              <a:rPr lang="en-US" sz="3600" dirty="0">
+                <a:hlinkClick r:id="rId2"/>
+              </a:rPr>
+              <a:t>https://support.microsoft.com/en-us/help/4017854</a:t>
+            </a:r>
+            <a:r>
+              <a:rPr lang="en-US" sz="3600" dirty="0"/>
+              <a:t> for a list of differences between InfoPath in SharePoint on-premises versus InfoPath in SharePoint Online</a:t>
+            </a:r>
+            <a:endParaRPr lang="nl-BE" sz="3600" dirty="0"/>
           </a:p>
         </p:txBody>
       </p:sp>
@@ -18133,15 +18149,6 @@
 </file>
 
 <file path=customXml/item1.xml><?xml version="1.0" encoding="utf-8"?>
-<?mso-contentType ?>
-<FormTemplates xmlns="http://schemas.microsoft.com/sharepoint/v3/contenttype/forms">
-  <Display>DocumentLibraryForm</Display>
-  <Edit>DocumentLibraryForm</Edit>
-  <New>DocumentLibraryForm</New>
-</FormTemplates>
-</file>
-
-<file path=customXml/item2.xml><?xml version="1.0" encoding="utf-8"?>
 <ct:contentTypeSchema xmlns:ct="http://schemas.microsoft.com/office/2006/metadata/contentType" xmlns:ma="http://schemas.microsoft.com/office/2006/metadata/properties/metaAttributes" ct:_="" ma:_="" ma:contentTypeName="Document" ma:contentTypeID="0x010100DD7BFE2324FCFB49A665688E9D54E8DB" ma:contentTypeVersion="3" ma:contentTypeDescription="Create a new document." ma:contentTypeScope="" ma:versionID="e2df71f908f08602d73af1545e85ca72">
   <xsd:schema xmlns:xsd="http://www.w3.org/2001/XMLSchema" xmlns:xs="http://www.w3.org/2001/XMLSchema" xmlns:p="http://schemas.microsoft.com/office/2006/metadata/properties" xmlns:ns2="5ec9502b-addf-4716-883a-9e6742fd5109" targetNamespace="http://schemas.microsoft.com/office/2006/metadata/properties" ma:root="true" ma:fieldsID="89260c093ecc6beccd23aa6703f8249f" ns2:_="">
     <xsd:import namespace="5ec9502b-addf-4716-883a-9e6742fd5109"/>
@@ -18295,6 +18302,15 @@
 </ct:contentTypeSchema>
 </file>
 
+<file path=customXml/item2.xml><?xml version="1.0" encoding="utf-8"?>
+<?mso-contentType ?>
+<FormTemplates xmlns="http://schemas.microsoft.com/sharepoint/v3/contenttype/forms">
+  <Display>DocumentLibraryForm</Display>
+  <Edit>DocumentLibraryForm</Edit>
+  <New>DocumentLibraryForm</New>
+</FormTemplates>
+</file>
+
 <file path=customXml/item3.xml><?xml version="1.0" encoding="utf-8"?>
 <Control xmlns="http://schemas.microsoft.com/VisualStudio/2011/storyboarding/control">
   <Id Name="System.Storyboarding.Backgrounds.WebBrowser" Revision="1" Stencil="System.Storyboarding.Backgrounds" StencilVersion="0.1"/>
@@ -18302,6 +18318,12 @@
 </file>
 
 <file path=customXml/item4.xml><?xml version="1.0" encoding="utf-8"?>
+<Control xmlns="http://schemas.microsoft.com/VisualStudio/2011/storyboarding/control">
+  <Id Name="System.Storyboarding.Backgrounds.WebBrowser" Revision="1" Stencil="System.Storyboarding.Backgrounds" StencilVersion="0.1"/>
+</Control>
+</file>
+
+<file path=customXml/item5.xml><?xml version="1.0" encoding="utf-8"?>
 <p:properties xmlns:p="http://schemas.microsoft.com/office/2006/metadata/properties" xmlns:xsi="http://www.w3.org/2001/XMLSchema-instance" xmlns:pc="http://schemas.microsoft.com/office/infopath/2007/PartnerControls">
   <documentManagement>
     <SharedWithUsers xmlns="5ec9502b-addf-4716-883a-9e6742fd5109">
@@ -18315,12 +18337,6 @@
 </p:properties>
 </file>
 
-<file path=customXml/item5.xml><?xml version="1.0" encoding="utf-8"?>
-<Control xmlns="http://schemas.microsoft.com/VisualStudio/2011/storyboarding/control">
-  <Id Name="System.Storyboarding.Backgrounds.WebBrowser" Revision="1" Stencil="System.Storyboarding.Backgrounds" StencilVersion="0.1"/>
-</Control>
-</file>
-
 <file path=customXml/item6.xml><?xml version="1.0" encoding="utf-8"?>
 <Control xmlns="http://schemas.microsoft.com/VisualStudio/2011/storyboarding/control">
   <Id Name="System.Storyboarding.Backgrounds.WebBrowser" Revision="1" Stencil="System.Storyboarding.Backgrounds" StencilVersion="0.1"/>
@@ -18328,14 +18344,6 @@
 </file>
 
 <file path=customXml/itemProps1.xml><?xml version="1.0" encoding="utf-8"?>
-<ds:datastoreItem xmlns:ds="http://schemas.openxmlformats.org/officeDocument/2006/customXml" ds:itemID="{B4606E04-852E-4880-8CD1-0B186F4087B1}">
-  <ds:schemaRefs>
-    <ds:schemaRef ds:uri="http://schemas.microsoft.com/sharepoint/v3/contenttype/forms"/>
-  </ds:schemaRefs>
-</ds:datastoreItem>
-</file>
-
-<file path=customXml/itemProps2.xml><?xml version="1.0" encoding="utf-8"?>
 <ds:datastoreItem xmlns:ds="http://schemas.openxmlformats.org/officeDocument/2006/customXml" ds:itemID="{F9995C7B-D0AF-4C77-9DB7-FC5B0BF9FC9F}">
   <ds:schemaRefs>
     <ds:schemaRef ds:uri="http://schemas.microsoft.com/office/2006/metadata/contentType"/>
@@ -18353,8 +18361,16 @@
 </ds:datastoreItem>
 </file>
 
+<file path=customXml/itemProps2.xml><?xml version="1.0" encoding="utf-8"?>
+<ds:datastoreItem xmlns:ds="http://schemas.openxmlformats.org/officeDocument/2006/customXml" ds:itemID="{B4606E04-852E-4880-8CD1-0B186F4087B1}">
+  <ds:schemaRefs>
+    <ds:schemaRef ds:uri="http://schemas.microsoft.com/sharepoint/v3/contenttype/forms"/>
+  </ds:schemaRefs>
+</ds:datastoreItem>
+</file>
+
 <file path=customXml/itemProps3.xml><?xml version="1.0" encoding="utf-8"?>
-<ds:datastoreItem xmlns:ds="http://schemas.openxmlformats.org/officeDocument/2006/customXml" ds:itemID="{57ED2E3B-EB43-4252-8C73-98EA6ACC344E}">
+<ds:datastoreItem xmlns:ds="http://schemas.openxmlformats.org/officeDocument/2006/customXml" ds:itemID="{6769EEFD-0F61-4AA2-AE02-4E16ED5BCFE8}">
   <ds:schemaRefs>
     <ds:schemaRef ds:uri="http://schemas.microsoft.com/VisualStudio/2011/storyboarding/control"/>
   </ds:schemaRefs>
@@ -18362,6 +18378,14 @@
 </file>
 
 <file path=customXml/itemProps4.xml><?xml version="1.0" encoding="utf-8"?>
+<ds:datastoreItem xmlns:ds="http://schemas.openxmlformats.org/officeDocument/2006/customXml" ds:itemID="{CE030D2D-A334-4C40-95AD-E97580D89B11}">
+  <ds:schemaRefs>
+    <ds:schemaRef ds:uri="http://schemas.microsoft.com/VisualStudio/2011/storyboarding/control"/>
+  </ds:schemaRefs>
+</ds:datastoreItem>
+</file>
+
+<file path=customXml/itemProps5.xml><?xml version="1.0" encoding="utf-8"?>
 <ds:datastoreItem xmlns:ds="http://schemas.openxmlformats.org/officeDocument/2006/customXml" ds:itemID="{F1AEA8A7-A694-4DB0-82AB-EF48F2E9B6F9}">
   <ds:schemaRefs>
     <ds:schemaRef ds:uri="http://purl.org/dc/elements/1.1/"/>
@@ -18377,16 +18401,8 @@
 </ds:datastoreItem>
 </file>
 
-<file path=customXml/itemProps5.xml><?xml version="1.0" encoding="utf-8"?>
-<ds:datastoreItem xmlns:ds="http://schemas.openxmlformats.org/officeDocument/2006/customXml" ds:itemID="{CE030D2D-A334-4C40-95AD-E97580D89B11}">
-  <ds:schemaRefs>
-    <ds:schemaRef ds:uri="http://schemas.microsoft.com/VisualStudio/2011/storyboarding/control"/>
-  </ds:schemaRefs>
-</ds:datastoreItem>
-</file>
-
 <file path=customXml/itemProps6.xml><?xml version="1.0" encoding="utf-8"?>
-<ds:datastoreItem xmlns:ds="http://schemas.openxmlformats.org/officeDocument/2006/customXml" ds:itemID="{6769EEFD-0F61-4AA2-AE02-4E16ED5BCFE8}">
+<ds:datastoreItem xmlns:ds="http://schemas.openxmlformats.org/officeDocument/2006/customXml" ds:itemID="{57ED2E3B-EB43-4252-8C73-98EA6ACC344E}">
   <ds:schemaRefs>
     <ds:schemaRef ds:uri="http://schemas.microsoft.com/VisualStudio/2011/storyboarding/control"/>
   </ds:schemaRefs>

</xml_diff>